<commit_message>
Jel. helyzet c. dia tartalmi elemeinek megírása
</commit_message>
<xml_diff>
--- a/docs/Autószerelő alkalmazás.pptx
+++ b/docs/Autószerelő alkalmazás.pptx
@@ -5913,10 +5913,31 @@
         </p:nvSpPr>
         <p:spPr/>
         <p:txBody>
-          <a:bodyPr/>
-          <a:lstStyle/>
-          <a:p>
-            <a:endParaRPr lang="hu-HU"/>
+          <a:bodyPr>
+            <a:normAutofit fontScale="92500"/>
+          </a:bodyPr>
+          <a:lstStyle/>
+          <a:p>
+            <a:r>
+              <a:rPr lang="hu-HU" dirty="0"/>
+              <a:t>Cégünk jelenleg is használt adminisztrációs rendszerét korábban az Önök </a:t>
+            </a:r>
+            <a:r>
+              <a:rPr lang="hu-HU" dirty="0" err="1"/>
+              <a:t>cége</a:t>
+            </a:r>
+            <a:r>
+              <a:rPr lang="hu-HU" dirty="0"/>
+              <a:t> készítette el számunkra. A programmal elégedettek vagyunk, azonban a gyorsan fejlődő világban, rohamosan változó piaci helyzet mellett, elkerülhetetlenné vált ezen program továbbfejlesztése is. Programunkban képesek vagyunk rögzíteni az autókat valamint a hozzájuk kapcsolódó ügyfeleket. Itt követjük nyomon a szerelések árát is. A kifizetett autókat egy hónapon belül töröljük az adatbázisból. Azt is tudni érdemes, hogy az Önök által használt alkalmazásának is vannak hiányosságai amik orvosolása nagyban megkönnyítené a jelenlegi adminisztrációs folyamatainkat</a:t>
+            </a:r>
+            <a:r>
+              <a:rPr lang="hu-HU"/>
+              <a:t>, ezért megkérjük </a:t>
+            </a:r>
+            <a:r>
+              <a:rPr lang="hu-HU" dirty="0"/>
+              <a:t>önöket az alkalmazás továbbfejlesztésére.</a:t>
+            </a:r>
           </a:p>
         </p:txBody>
       </p:sp>

</xml_diff>

<commit_message>
Köv.lista c. dia tartalmi elemeinek megírása
</commit_message>
<xml_diff>
--- a/docs/Autószerelő alkalmazás.pptx
+++ b/docs/Autószerelő alkalmazás.pptx
@@ -8,6 +8,7 @@
     <p:sldId id="256" r:id="rId2"/>
     <p:sldId id="257" r:id="rId3"/>
     <p:sldId id="258" r:id="rId4"/>
+    <p:sldId id="259" r:id="rId5"/>
   </p:sldIdLst>
   <p:sldSz cx="12192000" cy="6858000"/>
   <p:notesSz cx="6858000" cy="9144000"/>
@@ -5928,15 +5929,7 @@
             </a:r>
             <a:r>
               <a:rPr lang="hu-HU" dirty="0"/>
-              <a:t> készítette el számunkra. A programmal elégedettek vagyunk, azonban a gyorsan fejlődő világban, rohamosan változó piaci helyzet mellett, elkerülhetetlenné vált ezen program továbbfejlesztése is. Programunkban képesek vagyunk rögzíteni az autókat valamint a hozzájuk kapcsolódó ügyfeleket. Itt követjük nyomon a szerelések árát is. A kifizetett autókat egy hónapon belül töröljük az adatbázisból. Azt is tudni érdemes, hogy az Önök által használt alkalmazásának is vannak hiányosságai amik orvosolása nagyban megkönnyítené a jelenlegi adminisztrációs folyamatainkat</a:t>
-            </a:r>
-            <a:r>
-              <a:rPr lang="hu-HU"/>
-              <a:t>, ezért megkérjük </a:t>
-            </a:r>
-            <a:r>
-              <a:rPr lang="hu-HU" dirty="0"/>
-              <a:t>önöket az alkalmazás továbbfejlesztésére.</a:t>
+              <a:t> készítette el számunkra. A programmal elégedettek vagyunk, azonban a gyorsan fejlődő világban, rohamosan változó piaci helyzet mellett, elkerülhetetlenné vált ezen program továbbfejlesztése is. Programunkban képesek vagyunk rögzíteni az autókat valamint a hozzájuk kapcsolódó ügyfeleket. Itt követjük nyomon a szerelések árát is. A kifizetett autókat egy hónapon belül töröljük az adatbázisból. Azt is tudni érdemes, hogy az Önök által használt alkalmazásának is vannak hiányosságai amik orvosolása nagyban megkönnyítené a jelenlegi adminisztrációs folyamatainkat, ezért megkérjük önöket az alkalmazás továbbfejlesztésére.</a:t>
             </a:r>
           </a:p>
         </p:txBody>
@@ -5945,6 +5938,124 @@
     <p:extLst>
       <p:ext uri="{BB962C8B-B14F-4D97-AF65-F5344CB8AC3E}">
         <p14:creationId xmlns:p14="http://schemas.microsoft.com/office/powerpoint/2010/main" val="2205534429"/>
+      </p:ext>
+    </p:extLst>
+  </p:cSld>
+  <p:clrMapOvr>
+    <a:masterClrMapping/>
+  </p:clrMapOvr>
+</p:sld>
+</file>
+
+<file path=ppt/slides/slide4.xml><?xml version="1.0" encoding="utf-8"?>
+<p:sld xmlns:a="http://schemas.openxmlformats.org/drawingml/2006/main" xmlns:r="http://schemas.openxmlformats.org/officeDocument/2006/relationships" xmlns:p="http://schemas.openxmlformats.org/presentationml/2006/main">
+  <p:cSld>
+    <p:spTree>
+      <p:nvGrpSpPr>
+        <p:cNvPr id="1" name=""/>
+        <p:cNvGrpSpPr/>
+        <p:nvPr/>
+      </p:nvGrpSpPr>
+      <p:grpSpPr>
+        <a:xfrm>
+          <a:off x="0" y="0"/>
+          <a:ext cx="0" cy="0"/>
+          <a:chOff x="0" y="0"/>
+          <a:chExt cx="0" cy="0"/>
+        </a:xfrm>
+      </p:grpSpPr>
+      <p:sp>
+        <p:nvSpPr>
+          <p:cNvPr id="2" name="Cím 1">
+            <a:extLst>
+              <a:ext uri="{FF2B5EF4-FFF2-40B4-BE49-F238E27FC236}">
+                <a16:creationId xmlns:a16="http://schemas.microsoft.com/office/drawing/2014/main" id="{B83FB394-910A-401C-A779-9261B6FAAA8C}"/>
+              </a:ext>
+            </a:extLst>
+          </p:cNvPr>
+          <p:cNvSpPr>
+            <a:spLocks noGrp="1"/>
+          </p:cNvSpPr>
+          <p:nvPr>
+            <p:ph type="title"/>
+          </p:nvPr>
+        </p:nvSpPr>
+        <p:spPr/>
+        <p:txBody>
+          <a:bodyPr/>
+          <a:lstStyle/>
+          <a:p>
+            <a:r>
+              <a:rPr lang="hu-HU" dirty="0"/>
+              <a:t>Követelménylista</a:t>
+            </a:r>
+          </a:p>
+        </p:txBody>
+      </p:sp>
+      <p:sp>
+        <p:nvSpPr>
+          <p:cNvPr id="3" name="Tartalom helye 2">
+            <a:extLst>
+              <a:ext uri="{FF2B5EF4-FFF2-40B4-BE49-F238E27FC236}">
+                <a16:creationId xmlns:a16="http://schemas.microsoft.com/office/drawing/2014/main" id="{2D9202D2-F3CB-4B76-B1BA-BBBF090747F9}"/>
+              </a:ext>
+            </a:extLst>
+          </p:cNvPr>
+          <p:cNvSpPr>
+            <a:spLocks noGrp="1"/>
+          </p:cNvSpPr>
+          <p:nvPr>
+            <p:ph idx="1"/>
+          </p:nvPr>
+        </p:nvSpPr>
+        <p:spPr/>
+        <p:txBody>
+          <a:bodyPr/>
+          <a:lstStyle/>
+          <a:p>
+            <a:r>
+              <a:rPr lang="hu-HU" dirty="0"/>
+              <a:t>A rendszer legyen képes az autók mellett a szerelők nyilvántartására is.</a:t>
+            </a:r>
+          </a:p>
+          <a:p>
+            <a:r>
+              <a:rPr lang="hu-HU" dirty="0"/>
+              <a:t>A rendszer legyen képes részletes adattárolásra (egy tulajdonoshoz több autót is hozzá lehessen rendelni.)</a:t>
+            </a:r>
+          </a:p>
+          <a:p>
+            <a:r>
+              <a:rPr lang="hu-HU" dirty="0"/>
+              <a:t>Legyünk </a:t>
+            </a:r>
+            <a:r>
+              <a:rPr lang="hu-HU"/>
+              <a:t>képesek külön-külön </a:t>
+            </a:r>
+            <a:r>
+              <a:rPr lang="hu-HU" dirty="0"/>
+              <a:t>szerkeszteni az ilyen jellegű autókat (melyek egy tulajdonoshoz vannak rendelve.)</a:t>
+            </a:r>
+          </a:p>
+          <a:p>
+            <a:r>
+              <a:rPr lang="hu-HU" dirty="0"/>
+              <a:t>A programunk továbbfejlesztett verziója is, egyszerű, letisztult, könnyedén kezelhető, felhasználóbarát felülettel rendelkezzen.</a:t>
+            </a:r>
+          </a:p>
+          <a:p>
+            <a:pPr marL="0" indent="0">
+              <a:buNone/>
+            </a:pPr>
+            <a:endParaRPr lang="hu-HU" dirty="0"/>
+          </a:p>
+        </p:txBody>
+      </p:sp>
+    </p:spTree>
+    <p:extLst>
+      <p:ext uri="{BB962C8B-B14F-4D97-AF65-F5344CB8AC3E}">
+        <p14:creationId xmlns:p14="http://schemas.microsoft.com/office/powerpoint/2010/main" val="2651361256"/>
       </p:ext>
     </p:extLst>
   </p:cSld>

</xml_diff>

<commit_message>
A szoft.jel.helyz. c. dia tartalmi elkészítése
</commit_message>
<xml_diff>
--- a/docs/Autószerelő alkalmazás.pptx
+++ b/docs/Autószerelő alkalmazás.pptx
@@ -6121,8 +6121,60 @@
         </p:nvSpPr>
         <p:spPr/>
         <p:txBody>
-          <a:bodyPr/>
-          <a:lstStyle/>
+          <a:bodyPr>
+            <a:normAutofit/>
+          </a:bodyPr>
+          <a:lstStyle/>
+          <a:p>
+            <a:r>
+              <a:rPr lang="hu-HU" dirty="0"/>
+              <a:t>Csapatunk elkészítette a továbbfejlesztett program prototípusát.</a:t>
+            </a:r>
+          </a:p>
+          <a:p>
+            <a:r>
+              <a:rPr lang="hu-HU" dirty="0"/>
+              <a:t>Elvégeztük a program megfelelő működéséhez elengedhetetlen beállításokat.</a:t>
+            </a:r>
+          </a:p>
+          <a:p>
+            <a:r>
+              <a:rPr lang="hu-HU" dirty="0"/>
+              <a:t>Elkészítettük a programban szereplő </a:t>
+            </a:r>
+            <a:r>
+              <a:rPr lang="hu-HU"/>
+              <a:t>különböző entitásokat:</a:t>
+            </a:r>
+            <a:endParaRPr lang="hu-HU" dirty="0"/>
+          </a:p>
+          <a:p>
+            <a:pPr marL="0" indent="0">
+              <a:buNone/>
+            </a:pPr>
+            <a:r>
+              <a:rPr lang="hu-HU" dirty="0"/>
+              <a:t> - A szoftvert használó adminisztrációs munkatársak</a:t>
+            </a:r>
+          </a:p>
+          <a:p>
+            <a:pPr marL="0" indent="0">
+              <a:buNone/>
+            </a:pPr>
+            <a:r>
+              <a:rPr lang="hu-HU" dirty="0"/>
+              <a:t> - A szoftvert használó szerelők</a:t>
+            </a:r>
+          </a:p>
+          <a:p>
+            <a:pPr marL="0" indent="0">
+              <a:buNone/>
+            </a:pPr>
+            <a:r>
+              <a:rPr lang="hu-HU" dirty="0"/>
+              <a:t> - (Azon munkatársak akik a későbbiekben kerülnek felvételre)</a:t>
+            </a:r>
+          </a:p>
           <a:p>
             <a:endParaRPr lang="hu-HU" dirty="0"/>
           </a:p>

</xml_diff>

<commit_message>
Old.szerk c. dia tartalmának megírása
</commit_message>
<xml_diff>
--- a/docs/Autószerelő alkalmazás.pptx
+++ b/docs/Autószerelő alkalmazás.pptx
@@ -10,6 +10,10 @@
     <p:sldId id="258" r:id="rId4"/>
     <p:sldId id="259" r:id="rId5"/>
     <p:sldId id="260" r:id="rId6"/>
+    <p:sldId id="261" r:id="rId7"/>
+    <p:sldId id="262" r:id="rId8"/>
+    <p:sldId id="263" r:id="rId9"/>
+    <p:sldId id="264" r:id="rId10"/>
   </p:sldIdLst>
   <p:sldSz cx="12192000" cy="6858000"/>
   <p:notesSz cx="6858000" cy="9144000"/>
@@ -6140,13 +6144,8 @@
           <a:p>
             <a:r>
               <a:rPr lang="hu-HU" dirty="0"/>
-              <a:t>Elkészítettük a programban szereplő </a:t>
-            </a:r>
-            <a:r>
-              <a:rPr lang="hu-HU"/>
-              <a:t>különböző entitásokat:</a:t>
-            </a:r>
-            <a:endParaRPr lang="hu-HU" dirty="0"/>
+              <a:t>Elkészítettük a programban szereplő különböző entitásokat:</a:t>
+            </a:r>
           </a:p>
           <a:p>
             <a:pPr marL="0" indent="0">
@@ -6184,6 +6183,503 @@
     <p:extLst>
       <p:ext uri="{BB962C8B-B14F-4D97-AF65-F5344CB8AC3E}">
         <p14:creationId xmlns:p14="http://schemas.microsoft.com/office/powerpoint/2010/main" val="470884550"/>
+      </p:ext>
+    </p:extLst>
+  </p:cSld>
+  <p:clrMapOvr>
+    <a:masterClrMapping/>
+  </p:clrMapOvr>
+</p:sld>
+</file>
+
+<file path=ppt/slides/slide6.xml><?xml version="1.0" encoding="utf-8"?>
+<p:sld xmlns:a="http://schemas.openxmlformats.org/drawingml/2006/main" xmlns:r="http://schemas.openxmlformats.org/officeDocument/2006/relationships" xmlns:p="http://schemas.openxmlformats.org/presentationml/2006/main">
+  <p:cSld>
+    <p:spTree>
+      <p:nvGrpSpPr>
+        <p:cNvPr id="1" name=""/>
+        <p:cNvGrpSpPr/>
+        <p:nvPr/>
+      </p:nvGrpSpPr>
+      <p:grpSpPr>
+        <a:xfrm>
+          <a:off x="0" y="0"/>
+          <a:ext cx="0" cy="0"/>
+          <a:chOff x="0" y="0"/>
+          <a:chExt cx="0" cy="0"/>
+        </a:xfrm>
+      </p:grpSpPr>
+      <p:sp>
+        <p:nvSpPr>
+          <p:cNvPr id="2" name="Cím 1">
+            <a:extLst>
+              <a:ext uri="{FF2B5EF4-FFF2-40B4-BE49-F238E27FC236}">
+                <a16:creationId xmlns:a16="http://schemas.microsoft.com/office/drawing/2014/main" id="{7B83C84F-D38F-40FB-8A75-8D8929011BCC}"/>
+              </a:ext>
+            </a:extLst>
+          </p:cNvPr>
+          <p:cNvSpPr>
+            <a:spLocks noGrp="1"/>
+          </p:cNvSpPr>
+          <p:nvPr>
+            <p:ph type="title"/>
+          </p:nvPr>
+        </p:nvSpPr>
+        <p:spPr/>
+        <p:txBody>
+          <a:bodyPr/>
+          <a:lstStyle/>
+          <a:p>
+            <a:r>
+              <a:rPr lang="hu-HU" dirty="0"/>
+              <a:t>Oldalszerkezet</a:t>
+            </a:r>
+          </a:p>
+        </p:txBody>
+      </p:sp>
+      <p:sp>
+        <p:nvSpPr>
+          <p:cNvPr id="3" name="Tartalom helye 2">
+            <a:extLst>
+              <a:ext uri="{FF2B5EF4-FFF2-40B4-BE49-F238E27FC236}">
+                <a16:creationId xmlns:a16="http://schemas.microsoft.com/office/drawing/2014/main" id="{A090C577-142C-4D79-AD46-0BCDAFB66688}"/>
+              </a:ext>
+            </a:extLst>
+          </p:cNvPr>
+          <p:cNvSpPr>
+            <a:spLocks noGrp="1"/>
+          </p:cNvSpPr>
+          <p:nvPr>
+            <p:ph idx="1"/>
+          </p:nvPr>
+        </p:nvSpPr>
+        <p:spPr/>
+        <p:txBody>
+          <a:bodyPr>
+            <a:normAutofit lnSpcReduction="10000"/>
+          </a:bodyPr>
+          <a:lstStyle/>
+          <a:p>
+            <a:r>
+              <a:rPr lang="hu-HU" dirty="0"/>
+              <a:t>Program indulásakor csatlakozik az adatbázishoz, ellenőrzi annak meglétét, amennyiben nincsenek meg a tábláink, akkor létrehozza azokat.</a:t>
+            </a:r>
+          </a:p>
+          <a:p>
+            <a:r>
+              <a:rPr lang="hu-HU" dirty="0"/>
+              <a:t>Az alkalmazás </a:t>
+            </a:r>
+            <a:r>
+              <a:rPr lang="hu-HU" dirty="0" err="1"/>
+              <a:t>degisn</a:t>
+            </a:r>
+            <a:r>
+              <a:rPr lang="hu-HU" dirty="0"/>
+              <a:t>-ja </a:t>
+            </a:r>
+            <a:r>
+              <a:rPr lang="hu-HU" dirty="0" err="1"/>
+              <a:t>javaFX</a:t>
+            </a:r>
+            <a:r>
+              <a:rPr lang="hu-HU" dirty="0"/>
+              <a:t>  - FXML , ehhez készült CSS.</a:t>
+            </a:r>
+          </a:p>
+          <a:p>
+            <a:r>
+              <a:rPr lang="hu-HU" dirty="0"/>
+              <a:t>Az alkalmazás fő elemeit elkészítettük melyek a következőek:</a:t>
+            </a:r>
+          </a:p>
+          <a:p>
+            <a:r>
+              <a:rPr lang="hu-HU" dirty="0"/>
+              <a:t>menü mely tartalmazza:</a:t>
+            </a:r>
+          </a:p>
+          <a:p>
+            <a:r>
+              <a:rPr lang="hu-HU" dirty="0"/>
+              <a:t>- Felvétel gomb, Autók és tulajok gomb, Dolgozó felvétel gomb, Dolgozó gomb.</a:t>
+            </a:r>
+          </a:p>
+          <a:p>
+            <a:pPr marL="0" indent="0">
+              <a:buNone/>
+            </a:pPr>
+            <a:endParaRPr lang="hu-HU" dirty="0"/>
+          </a:p>
+        </p:txBody>
+      </p:sp>
+    </p:spTree>
+    <p:extLst>
+      <p:ext uri="{BB962C8B-B14F-4D97-AF65-F5344CB8AC3E}">
+        <p14:creationId xmlns:p14="http://schemas.microsoft.com/office/powerpoint/2010/main" val="2748294427"/>
+      </p:ext>
+    </p:extLst>
+  </p:cSld>
+  <p:clrMapOvr>
+    <a:masterClrMapping/>
+  </p:clrMapOvr>
+</p:sld>
+</file>
+
+<file path=ppt/slides/slide7.xml><?xml version="1.0" encoding="utf-8"?>
+<p:sld xmlns:a="http://schemas.openxmlformats.org/drawingml/2006/main" xmlns:r="http://schemas.openxmlformats.org/officeDocument/2006/relationships" xmlns:p="http://schemas.openxmlformats.org/presentationml/2006/main">
+  <p:cSld>
+    <p:spTree>
+      <p:nvGrpSpPr>
+        <p:cNvPr id="1" name=""/>
+        <p:cNvGrpSpPr/>
+        <p:nvPr/>
+      </p:nvGrpSpPr>
+      <p:grpSpPr>
+        <a:xfrm>
+          <a:off x="0" y="0"/>
+          <a:ext cx="0" cy="0"/>
+          <a:chOff x="0" y="0"/>
+          <a:chExt cx="0" cy="0"/>
+        </a:xfrm>
+      </p:grpSpPr>
+      <p:sp>
+        <p:nvSpPr>
+          <p:cNvPr id="2" name="Cím 1">
+            <a:extLst>
+              <a:ext uri="{FF2B5EF4-FFF2-40B4-BE49-F238E27FC236}">
+                <a16:creationId xmlns:a16="http://schemas.microsoft.com/office/drawing/2014/main" id="{A627C42B-7496-4EA9-A5DF-865CBFB12D4E}"/>
+              </a:ext>
+            </a:extLst>
+          </p:cNvPr>
+          <p:cNvSpPr>
+            <a:spLocks noGrp="1"/>
+          </p:cNvSpPr>
+          <p:nvPr>
+            <p:ph type="title"/>
+          </p:nvPr>
+        </p:nvSpPr>
+        <p:spPr/>
+        <p:txBody>
+          <a:bodyPr/>
+          <a:lstStyle/>
+          <a:p>
+            <a:r>
+              <a:rPr lang="hu-HU" dirty="0"/>
+              <a:t>Db kapcsolat</a:t>
+            </a:r>
+          </a:p>
+        </p:txBody>
+      </p:sp>
+      <p:sp>
+        <p:nvSpPr>
+          <p:cNvPr id="5" name="Tartalom helye 4">
+            <a:extLst>
+              <a:ext uri="{FF2B5EF4-FFF2-40B4-BE49-F238E27FC236}">
+                <a16:creationId xmlns:a16="http://schemas.microsoft.com/office/drawing/2014/main" id="{EE2ACED6-679E-4820-B310-CD1F05678E55}"/>
+              </a:ext>
+            </a:extLst>
+          </p:cNvPr>
+          <p:cNvSpPr>
+            <a:spLocks noGrp="1"/>
+          </p:cNvSpPr>
+          <p:nvPr>
+            <p:ph idx="1"/>
+          </p:nvPr>
+        </p:nvSpPr>
+        <p:spPr/>
+        <p:txBody>
+          <a:bodyPr/>
+          <a:lstStyle/>
+          <a:p>
+            <a:r>
+              <a:rPr lang="hu-HU" dirty="0"/>
+              <a:t>Adatbázis létrehozása </a:t>
+            </a:r>
+            <a:r>
+              <a:rPr lang="hu-HU" dirty="0" err="1"/>
+              <a:t>javax.persistence.Persistence</a:t>
+            </a:r>
+            <a:r>
+              <a:rPr lang="hu-HU" dirty="0"/>
+              <a:t> segítségével.</a:t>
+            </a:r>
+          </a:p>
+          <a:p>
+            <a:r>
+              <a:rPr lang="hu-HU" dirty="0"/>
+              <a:t>Az adatbázis konfiguráció a META-INF </a:t>
+            </a:r>
+            <a:r>
+              <a:rPr lang="hu-HU" dirty="0" err="1"/>
+              <a:t>persistence</a:t>
+            </a:r>
+            <a:r>
+              <a:rPr lang="hu-HU" dirty="0"/>
+              <a:t> </a:t>
+            </a:r>
+            <a:r>
+              <a:rPr lang="hu-HU" dirty="0" err="1"/>
+              <a:t>xml-ben</a:t>
+            </a:r>
+            <a:r>
+              <a:rPr lang="hu-HU" dirty="0"/>
+              <a:t> található.</a:t>
+            </a:r>
+          </a:p>
+          <a:p>
+            <a:r>
+              <a:rPr lang="hu-HU" dirty="0"/>
+              <a:t>Ez tartalmazza:</a:t>
+            </a:r>
+          </a:p>
+          <a:p>
+            <a:r>
+              <a:rPr lang="hu-HU" dirty="0"/>
+              <a:t>- az adatbázis elérési útját.</a:t>
+            </a:r>
+          </a:p>
+          <a:p>
+            <a:r>
+              <a:rPr lang="hu-HU" dirty="0"/>
+              <a:t>- csatlakozáshoz szükséges felhasználónevét és jelszavát.</a:t>
+            </a:r>
+          </a:p>
+          <a:p>
+            <a:r>
+              <a:rPr lang="hu-HU" dirty="0"/>
+              <a:t>- </a:t>
+            </a:r>
+            <a:r>
+              <a:rPr lang="hu-HU" dirty="0" err="1"/>
+              <a:t>MySQL</a:t>
+            </a:r>
+            <a:r>
+              <a:rPr lang="hu-HU" dirty="0"/>
+              <a:t> driver.</a:t>
+            </a:r>
+          </a:p>
+        </p:txBody>
+      </p:sp>
+    </p:spTree>
+    <p:extLst>
+      <p:ext uri="{BB962C8B-B14F-4D97-AF65-F5344CB8AC3E}">
+        <p14:creationId xmlns:p14="http://schemas.microsoft.com/office/powerpoint/2010/main" val="3681127729"/>
+      </p:ext>
+    </p:extLst>
+  </p:cSld>
+  <p:clrMapOvr>
+    <a:masterClrMapping/>
+  </p:clrMapOvr>
+</p:sld>
+</file>
+
+<file path=ppt/slides/slide8.xml><?xml version="1.0" encoding="utf-8"?>
+<p:sld xmlns:a="http://schemas.openxmlformats.org/drawingml/2006/main" xmlns:r="http://schemas.openxmlformats.org/officeDocument/2006/relationships" xmlns:p="http://schemas.openxmlformats.org/presentationml/2006/main">
+  <p:cSld>
+    <p:spTree>
+      <p:nvGrpSpPr>
+        <p:cNvPr id="1" name=""/>
+        <p:cNvGrpSpPr/>
+        <p:nvPr/>
+      </p:nvGrpSpPr>
+      <p:grpSpPr>
+        <a:xfrm>
+          <a:off x="0" y="0"/>
+          <a:ext cx="0" cy="0"/>
+          <a:chOff x="0" y="0"/>
+          <a:chExt cx="0" cy="0"/>
+        </a:xfrm>
+      </p:grpSpPr>
+      <p:sp>
+        <p:nvSpPr>
+          <p:cNvPr id="2" name="Cím 1">
+            <a:extLst>
+              <a:ext uri="{FF2B5EF4-FFF2-40B4-BE49-F238E27FC236}">
+                <a16:creationId xmlns:a16="http://schemas.microsoft.com/office/drawing/2014/main" id="{2652415D-7A47-4631-9F7A-BA4317A219D2}"/>
+              </a:ext>
+            </a:extLst>
+          </p:cNvPr>
+          <p:cNvSpPr>
+            <a:spLocks noGrp="1"/>
+          </p:cNvSpPr>
+          <p:nvPr>
+            <p:ph type="title"/>
+          </p:nvPr>
+        </p:nvSpPr>
+        <p:spPr/>
+        <p:txBody>
+          <a:bodyPr/>
+          <a:lstStyle/>
+          <a:p>
+            <a:r>
+              <a:rPr lang="hu-HU" dirty="0"/>
+              <a:t>Prototípus (nem végleges)</a:t>
+            </a:r>
+          </a:p>
+        </p:txBody>
+      </p:sp>
+      <p:sp>
+        <p:nvSpPr>
+          <p:cNvPr id="3" name="Tartalom helye 2">
+            <a:extLst>
+              <a:ext uri="{FF2B5EF4-FFF2-40B4-BE49-F238E27FC236}">
+                <a16:creationId xmlns:a16="http://schemas.microsoft.com/office/drawing/2014/main" id="{4F78DBE2-1432-4136-A31E-6FFA88917798}"/>
+              </a:ext>
+            </a:extLst>
+          </p:cNvPr>
+          <p:cNvSpPr>
+            <a:spLocks noGrp="1"/>
+          </p:cNvSpPr>
+          <p:nvPr>
+            <p:ph idx="1"/>
+          </p:nvPr>
+        </p:nvSpPr>
+        <p:spPr/>
+        <p:txBody>
+          <a:bodyPr>
+            <a:normAutofit fontScale="92500" lnSpcReduction="20000"/>
+          </a:bodyPr>
+          <a:lstStyle/>
+          <a:p>
+            <a:pPr marL="0" indent="0">
+              <a:buNone/>
+            </a:pPr>
+            <a:r>
+              <a:rPr lang="hu-HU" dirty="0"/>
+              <a:t>A prototípus alkalmazás tartalmazza: a főmenüt, melyből elérhetőek a fő funkciók, ezek igény szerint bővíthetőek.</a:t>
+            </a:r>
+          </a:p>
+          <a:p>
+            <a:pPr marL="0" indent="0">
+              <a:buNone/>
+            </a:pPr>
+            <a:r>
+              <a:rPr lang="hu-HU" dirty="0"/>
+              <a:t>- Felvétel funkción belül, lehetőségünk van új tulaj felvételére, valamint már meglévőkhöz új autót hozzárendelni.</a:t>
+            </a:r>
+          </a:p>
+          <a:p>
+            <a:pPr marL="0" indent="0">
+              <a:buNone/>
+            </a:pPr>
+            <a:r>
+              <a:rPr lang="hu-HU" dirty="0"/>
+              <a:t>- Az Autók és Tulajok funkció kilistázza a már meglévő autókat és a hozzájuk kapcsolódó tulajokat.</a:t>
+            </a:r>
+          </a:p>
+          <a:p>
+            <a:pPr>
+              <a:buFontTx/>
+              <a:buChar char="-"/>
+            </a:pPr>
+            <a:r>
+              <a:rPr lang="hu-HU" dirty="0"/>
+              <a:t>A Dolgozó felvétel funkción belül, tudunk új alkalmazottat hozzáadni a rendszerünkhöz.</a:t>
+            </a:r>
+          </a:p>
+          <a:p>
+            <a:pPr>
+              <a:buFontTx/>
+              <a:buChar char="-"/>
+            </a:pPr>
+            <a:r>
+              <a:rPr lang="hu-HU" dirty="0"/>
+              <a:t>A Dolgozó funkció kilistázza , a már meglévő alkalmazottakat.</a:t>
+            </a:r>
+          </a:p>
+          <a:p>
+            <a:pPr marL="0" indent="0">
+              <a:buNone/>
+            </a:pPr>
+            <a:endParaRPr lang="hu-HU" dirty="0"/>
+          </a:p>
+        </p:txBody>
+      </p:sp>
+    </p:spTree>
+    <p:extLst>
+      <p:ext uri="{BB962C8B-B14F-4D97-AF65-F5344CB8AC3E}">
+        <p14:creationId xmlns:p14="http://schemas.microsoft.com/office/powerpoint/2010/main" val="77804050"/>
+      </p:ext>
+    </p:extLst>
+  </p:cSld>
+  <p:clrMapOvr>
+    <a:masterClrMapping/>
+  </p:clrMapOvr>
+</p:sld>
+</file>
+
+<file path=ppt/slides/slide9.xml><?xml version="1.0" encoding="utf-8"?>
+<p:sld xmlns:a="http://schemas.openxmlformats.org/drawingml/2006/main" xmlns:r="http://schemas.openxmlformats.org/officeDocument/2006/relationships" xmlns:p="http://schemas.openxmlformats.org/presentationml/2006/main">
+  <p:cSld>
+    <p:spTree>
+      <p:nvGrpSpPr>
+        <p:cNvPr id="1" name=""/>
+        <p:cNvGrpSpPr/>
+        <p:nvPr/>
+      </p:nvGrpSpPr>
+      <p:grpSpPr>
+        <a:xfrm>
+          <a:off x="0" y="0"/>
+          <a:ext cx="0" cy="0"/>
+          <a:chOff x="0" y="0"/>
+          <a:chExt cx="0" cy="0"/>
+        </a:xfrm>
+      </p:grpSpPr>
+      <p:sp>
+        <p:nvSpPr>
+          <p:cNvPr id="2" name="Cím 1">
+            <a:extLst>
+              <a:ext uri="{FF2B5EF4-FFF2-40B4-BE49-F238E27FC236}">
+                <a16:creationId xmlns:a16="http://schemas.microsoft.com/office/drawing/2014/main" id="{D57738FF-9909-4F79-B2B2-91801B29F719}"/>
+              </a:ext>
+            </a:extLst>
+          </p:cNvPr>
+          <p:cNvSpPr>
+            <a:spLocks noGrp="1"/>
+          </p:cNvSpPr>
+          <p:nvPr>
+            <p:ph type="title"/>
+          </p:nvPr>
+        </p:nvSpPr>
+        <p:spPr/>
+        <p:txBody>
+          <a:bodyPr/>
+          <a:lstStyle/>
+          <a:p>
+            <a:endParaRPr lang="hu-HU"/>
+          </a:p>
+        </p:txBody>
+      </p:sp>
+      <p:sp>
+        <p:nvSpPr>
+          <p:cNvPr id="3" name="Tartalom helye 2">
+            <a:extLst>
+              <a:ext uri="{FF2B5EF4-FFF2-40B4-BE49-F238E27FC236}">
+                <a16:creationId xmlns:a16="http://schemas.microsoft.com/office/drawing/2014/main" id="{E22862AC-C894-401C-95FC-462A9C97BBD3}"/>
+              </a:ext>
+            </a:extLst>
+          </p:cNvPr>
+          <p:cNvSpPr>
+            <a:spLocks noGrp="1"/>
+          </p:cNvSpPr>
+          <p:nvPr>
+            <p:ph idx="1"/>
+          </p:nvPr>
+        </p:nvSpPr>
+        <p:spPr/>
+        <p:txBody>
+          <a:bodyPr/>
+          <a:lstStyle/>
+          <a:p>
+            <a:endParaRPr lang="hu-HU"/>
+          </a:p>
+        </p:txBody>
+      </p:sp>
+    </p:spTree>
+    <p:extLst>
+      <p:ext uri="{BB962C8B-B14F-4D97-AF65-F5344CB8AC3E}">
+        <p14:creationId xmlns:p14="http://schemas.microsoft.com/office/powerpoint/2010/main" val="2673036510"/>
       </p:ext>
     </p:extLst>
   </p:cSld>

</xml_diff>

<commit_message>
Prezentáció véglegesítése, feltöltése Git-re
</commit_message>
<xml_diff>
--- a/docs/Autószerelő alkalmazás.pptx
+++ b/docs/Autószerelő alkalmazás.pptx
@@ -14,6 +14,14 @@
     <p:sldId id="262" r:id="rId8"/>
     <p:sldId id="263" r:id="rId9"/>
     <p:sldId id="264" r:id="rId10"/>
+    <p:sldId id="265" r:id="rId11"/>
+    <p:sldId id="266" r:id="rId12"/>
+    <p:sldId id="267" r:id="rId13"/>
+    <p:sldId id="268" r:id="rId14"/>
+    <p:sldId id="269" r:id="rId15"/>
+    <p:sldId id="270" r:id="rId16"/>
+    <p:sldId id="271" r:id="rId17"/>
+    <p:sldId id="272" r:id="rId18"/>
   </p:sldIdLst>
   <p:sldSz cx="12192000" cy="6858000"/>
   <p:notesSz cx="6858000" cy="9144000"/>
@@ -5753,6 +5761,827 @@
   <p:clrMapOvr>
     <a:masterClrMapping/>
   </p:clrMapOvr>
+  <mc:AlternateContent xmlns:mc="http://schemas.openxmlformats.org/markup-compatibility/2006">
+    <mc:Choice xmlns:p159="http://schemas.microsoft.com/office/powerpoint/2015/09/main" Requires="p159">
+      <p:transition xmlns:p14="http://schemas.microsoft.com/office/powerpoint/2010/main" spd="slow" p14:dur="2000">
+        <p159:morph option="byObject"/>
+      </p:transition>
+    </mc:Choice>
+    <mc:Fallback>
+      <p:transition spd="slow">
+        <p:fade/>
+      </p:transition>
+    </mc:Fallback>
+  </mc:AlternateContent>
+</p:sld>
+</file>
+
+<file path=ppt/slides/slide10.xml><?xml version="1.0" encoding="utf-8"?>
+<p:sld xmlns:a="http://schemas.openxmlformats.org/drawingml/2006/main" xmlns:r="http://schemas.openxmlformats.org/officeDocument/2006/relationships" xmlns:p="http://schemas.openxmlformats.org/presentationml/2006/main">
+  <p:cSld>
+    <p:spTree>
+      <p:nvGrpSpPr>
+        <p:cNvPr id="1" name=""/>
+        <p:cNvGrpSpPr/>
+        <p:nvPr/>
+      </p:nvGrpSpPr>
+      <p:grpSpPr>
+        <a:xfrm>
+          <a:off x="0" y="0"/>
+          <a:ext cx="0" cy="0"/>
+          <a:chOff x="0" y="0"/>
+          <a:chExt cx="0" cy="0"/>
+        </a:xfrm>
+      </p:grpSpPr>
+      <p:sp>
+        <p:nvSpPr>
+          <p:cNvPr id="2" name="Cím 1">
+            <a:extLst>
+              <a:ext uri="{FF2B5EF4-FFF2-40B4-BE49-F238E27FC236}">
+                <a16:creationId xmlns:a16="http://schemas.microsoft.com/office/drawing/2014/main" id="{02B18EE3-06A8-4CE7-B5AE-1531976DD8C6}"/>
+              </a:ext>
+            </a:extLst>
+          </p:cNvPr>
+          <p:cNvSpPr>
+            <a:spLocks noGrp="1"/>
+          </p:cNvSpPr>
+          <p:nvPr>
+            <p:ph type="title"/>
+          </p:nvPr>
+        </p:nvSpPr>
+        <p:spPr/>
+        <p:txBody>
+          <a:bodyPr>
+            <a:normAutofit/>
+          </a:bodyPr>
+          <a:lstStyle/>
+          <a:p>
+            <a:r>
+              <a:rPr lang="hu-HU" dirty="0"/>
+              <a:t>Egy pár </a:t>
+            </a:r>
+            <a:r>
+              <a:rPr lang="hu-HU" dirty="0" err="1"/>
+              <a:t>screenshot</a:t>
+            </a:r>
+            <a:r>
+              <a:rPr lang="hu-HU" dirty="0"/>
+              <a:t> a jelenlegi helyzetről</a:t>
+            </a:r>
+          </a:p>
+        </p:txBody>
+      </p:sp>
+      <p:sp>
+        <p:nvSpPr>
+          <p:cNvPr id="3" name="Tartalom helye 2">
+            <a:extLst>
+              <a:ext uri="{FF2B5EF4-FFF2-40B4-BE49-F238E27FC236}">
+                <a16:creationId xmlns:a16="http://schemas.microsoft.com/office/drawing/2014/main" id="{7678128A-4FBC-4A66-A201-CA7DE1BC27A0}"/>
+              </a:ext>
+            </a:extLst>
+          </p:cNvPr>
+          <p:cNvSpPr>
+            <a:spLocks noGrp="1"/>
+          </p:cNvSpPr>
+          <p:nvPr>
+            <p:ph idx="1"/>
+          </p:nvPr>
+        </p:nvSpPr>
+        <p:spPr/>
+        <p:txBody>
+          <a:bodyPr/>
+          <a:lstStyle/>
+          <a:p>
+            <a:endParaRPr lang="hu-HU" dirty="0"/>
+          </a:p>
+        </p:txBody>
+      </p:sp>
+    </p:spTree>
+    <p:extLst>
+      <p:ext uri="{BB962C8B-B14F-4D97-AF65-F5344CB8AC3E}">
+        <p14:creationId xmlns:p14="http://schemas.microsoft.com/office/powerpoint/2010/main" val="988152779"/>
+      </p:ext>
+    </p:extLst>
+  </p:cSld>
+  <p:clrMapOvr>
+    <a:masterClrMapping/>
+  </p:clrMapOvr>
+  <mc:AlternateContent xmlns:mc="http://schemas.openxmlformats.org/markup-compatibility/2006">
+    <mc:Choice xmlns:p159="http://schemas.microsoft.com/office/powerpoint/2015/09/main" Requires="p159">
+      <p:transition xmlns:p14="http://schemas.microsoft.com/office/powerpoint/2010/main" spd="slow" p14:dur="2000">
+        <p159:morph option="byObject"/>
+      </p:transition>
+    </mc:Choice>
+    <mc:Fallback>
+      <p:transition spd="slow">
+        <p:fade/>
+      </p:transition>
+    </mc:Fallback>
+  </mc:AlternateContent>
+</p:sld>
+</file>
+
+<file path=ppt/slides/slide11.xml><?xml version="1.0" encoding="utf-8"?>
+<p:sld xmlns:a="http://schemas.openxmlformats.org/drawingml/2006/main" xmlns:r="http://schemas.openxmlformats.org/officeDocument/2006/relationships" xmlns:p="http://schemas.openxmlformats.org/presentationml/2006/main">
+  <p:cSld>
+    <p:spTree>
+      <p:nvGrpSpPr>
+        <p:cNvPr id="1" name=""/>
+        <p:cNvGrpSpPr/>
+        <p:nvPr/>
+      </p:nvGrpSpPr>
+      <p:grpSpPr>
+        <a:xfrm>
+          <a:off x="0" y="0"/>
+          <a:ext cx="0" cy="0"/>
+          <a:chOff x="0" y="0"/>
+          <a:chExt cx="0" cy="0"/>
+        </a:xfrm>
+      </p:grpSpPr>
+      <p:sp>
+        <p:nvSpPr>
+          <p:cNvPr id="2" name="Cím 1">
+            <a:extLst>
+              <a:ext uri="{FF2B5EF4-FFF2-40B4-BE49-F238E27FC236}">
+                <a16:creationId xmlns:a16="http://schemas.microsoft.com/office/drawing/2014/main" id="{C5CD88A0-8F96-4A46-B018-658E0498258A}"/>
+              </a:ext>
+            </a:extLst>
+          </p:cNvPr>
+          <p:cNvSpPr>
+            <a:spLocks noGrp="1"/>
+          </p:cNvSpPr>
+          <p:nvPr>
+            <p:ph type="title"/>
+          </p:nvPr>
+        </p:nvSpPr>
+        <p:spPr/>
+        <p:txBody>
+          <a:bodyPr/>
+          <a:lstStyle/>
+          <a:p>
+            <a:endParaRPr lang="hu-HU"/>
+          </a:p>
+        </p:txBody>
+      </p:sp>
+      <p:pic>
+        <p:nvPicPr>
+          <p:cNvPr id="5" name="Tartalom helye 4">
+            <a:extLst>
+              <a:ext uri="{FF2B5EF4-FFF2-40B4-BE49-F238E27FC236}">
+                <a16:creationId xmlns:a16="http://schemas.microsoft.com/office/drawing/2014/main" id="{6DDD5F05-E6F8-4EA6-9D1C-5A9A1995FFCD}"/>
+              </a:ext>
+            </a:extLst>
+          </p:cNvPr>
+          <p:cNvPicPr>
+            <a:picLocks noGrp="1" noChangeAspect="1"/>
+          </p:cNvPicPr>
+          <p:nvPr>
+            <p:ph idx="1"/>
+          </p:nvPr>
+        </p:nvPicPr>
+        <p:blipFill>
+          <a:blip r:embed="rId2"/>
+          <a:stretch>
+            <a:fillRect/>
+          </a:stretch>
+        </p:blipFill>
+        <p:spPr>
+          <a:xfrm>
+            <a:off x="2185555" y="767198"/>
+            <a:ext cx="7820889" cy="5108670"/>
+          </a:xfrm>
+        </p:spPr>
+      </p:pic>
+    </p:spTree>
+    <p:extLst>
+      <p:ext uri="{BB962C8B-B14F-4D97-AF65-F5344CB8AC3E}">
+        <p14:creationId xmlns:p14="http://schemas.microsoft.com/office/powerpoint/2010/main" val="143454896"/>
+      </p:ext>
+    </p:extLst>
+  </p:cSld>
+  <p:clrMapOvr>
+    <a:masterClrMapping/>
+  </p:clrMapOvr>
+  <mc:AlternateContent xmlns:mc="http://schemas.openxmlformats.org/markup-compatibility/2006">
+    <mc:Choice xmlns:p159="http://schemas.microsoft.com/office/powerpoint/2015/09/main" Requires="p159">
+      <p:transition xmlns:p14="http://schemas.microsoft.com/office/powerpoint/2010/main" spd="slow" p14:dur="2000">
+        <p159:morph option="byObject"/>
+      </p:transition>
+    </mc:Choice>
+    <mc:Fallback>
+      <p:transition spd="slow">
+        <p:fade/>
+      </p:transition>
+    </mc:Fallback>
+  </mc:AlternateContent>
+</p:sld>
+</file>
+
+<file path=ppt/slides/slide12.xml><?xml version="1.0" encoding="utf-8"?>
+<p:sld xmlns:a="http://schemas.openxmlformats.org/drawingml/2006/main" xmlns:r="http://schemas.openxmlformats.org/officeDocument/2006/relationships" xmlns:p="http://schemas.openxmlformats.org/presentationml/2006/main">
+  <p:cSld>
+    <p:spTree>
+      <p:nvGrpSpPr>
+        <p:cNvPr id="1" name=""/>
+        <p:cNvGrpSpPr/>
+        <p:nvPr/>
+      </p:nvGrpSpPr>
+      <p:grpSpPr>
+        <a:xfrm>
+          <a:off x="0" y="0"/>
+          <a:ext cx="0" cy="0"/>
+          <a:chOff x="0" y="0"/>
+          <a:chExt cx="0" cy="0"/>
+        </a:xfrm>
+      </p:grpSpPr>
+      <p:sp>
+        <p:nvSpPr>
+          <p:cNvPr id="2" name="Cím 1">
+            <a:extLst>
+              <a:ext uri="{FF2B5EF4-FFF2-40B4-BE49-F238E27FC236}">
+                <a16:creationId xmlns:a16="http://schemas.microsoft.com/office/drawing/2014/main" id="{447D2626-39FB-48AF-B647-F0A59D724242}"/>
+              </a:ext>
+            </a:extLst>
+          </p:cNvPr>
+          <p:cNvSpPr>
+            <a:spLocks noGrp="1"/>
+          </p:cNvSpPr>
+          <p:nvPr>
+            <p:ph type="title"/>
+          </p:nvPr>
+        </p:nvSpPr>
+        <p:spPr/>
+        <p:txBody>
+          <a:bodyPr/>
+          <a:lstStyle/>
+          <a:p>
+            <a:endParaRPr lang="hu-HU"/>
+          </a:p>
+        </p:txBody>
+      </p:sp>
+      <p:pic>
+        <p:nvPicPr>
+          <p:cNvPr id="5" name="Tartalom helye 4">
+            <a:extLst>
+              <a:ext uri="{FF2B5EF4-FFF2-40B4-BE49-F238E27FC236}">
+                <a16:creationId xmlns:a16="http://schemas.microsoft.com/office/drawing/2014/main" id="{FBA71C7F-3DF0-4654-A462-8762A3C228E9}"/>
+              </a:ext>
+            </a:extLst>
+          </p:cNvPr>
+          <p:cNvPicPr>
+            <a:picLocks noGrp="1" noChangeAspect="1"/>
+          </p:cNvPicPr>
+          <p:nvPr>
+            <p:ph idx="1"/>
+          </p:nvPr>
+        </p:nvPicPr>
+        <p:blipFill>
+          <a:blip r:embed="rId2"/>
+          <a:stretch>
+            <a:fillRect/>
+          </a:stretch>
+        </p:blipFill>
+        <p:spPr>
+          <a:xfrm>
+            <a:off x="2563091" y="1245369"/>
+            <a:ext cx="7065818" cy="4753889"/>
+          </a:xfrm>
+        </p:spPr>
+      </p:pic>
+    </p:spTree>
+    <p:extLst>
+      <p:ext uri="{BB962C8B-B14F-4D97-AF65-F5344CB8AC3E}">
+        <p14:creationId xmlns:p14="http://schemas.microsoft.com/office/powerpoint/2010/main" val="2410077994"/>
+      </p:ext>
+    </p:extLst>
+  </p:cSld>
+  <p:clrMapOvr>
+    <a:masterClrMapping/>
+  </p:clrMapOvr>
+  <mc:AlternateContent xmlns:mc="http://schemas.openxmlformats.org/markup-compatibility/2006">
+    <mc:Choice xmlns:p159="http://schemas.microsoft.com/office/powerpoint/2015/09/main" Requires="p159">
+      <p:transition xmlns:p14="http://schemas.microsoft.com/office/powerpoint/2010/main" spd="slow" p14:dur="2000">
+        <p159:morph option="byObject"/>
+      </p:transition>
+    </mc:Choice>
+    <mc:Fallback>
+      <p:transition spd="slow">
+        <p:fade/>
+      </p:transition>
+    </mc:Fallback>
+  </mc:AlternateContent>
+</p:sld>
+</file>
+
+<file path=ppt/slides/slide13.xml><?xml version="1.0" encoding="utf-8"?>
+<p:sld xmlns:a="http://schemas.openxmlformats.org/drawingml/2006/main" xmlns:r="http://schemas.openxmlformats.org/officeDocument/2006/relationships" xmlns:p="http://schemas.openxmlformats.org/presentationml/2006/main">
+  <p:cSld>
+    <p:spTree>
+      <p:nvGrpSpPr>
+        <p:cNvPr id="1" name=""/>
+        <p:cNvGrpSpPr/>
+        <p:nvPr/>
+      </p:nvGrpSpPr>
+      <p:grpSpPr>
+        <a:xfrm>
+          <a:off x="0" y="0"/>
+          <a:ext cx="0" cy="0"/>
+          <a:chOff x="0" y="0"/>
+          <a:chExt cx="0" cy="0"/>
+        </a:xfrm>
+      </p:grpSpPr>
+      <p:sp>
+        <p:nvSpPr>
+          <p:cNvPr id="2" name="Cím 1">
+            <a:extLst>
+              <a:ext uri="{FF2B5EF4-FFF2-40B4-BE49-F238E27FC236}">
+                <a16:creationId xmlns:a16="http://schemas.microsoft.com/office/drawing/2014/main" id="{605A9BF1-D4BA-4664-B74B-2C2B3F85C63C}"/>
+              </a:ext>
+            </a:extLst>
+          </p:cNvPr>
+          <p:cNvSpPr>
+            <a:spLocks noGrp="1"/>
+          </p:cNvSpPr>
+          <p:nvPr>
+            <p:ph type="title"/>
+          </p:nvPr>
+        </p:nvSpPr>
+        <p:spPr/>
+        <p:txBody>
+          <a:bodyPr/>
+          <a:lstStyle/>
+          <a:p>
+            <a:endParaRPr lang="hu-HU"/>
+          </a:p>
+        </p:txBody>
+      </p:sp>
+      <p:pic>
+        <p:nvPicPr>
+          <p:cNvPr id="5" name="Tartalom helye 4">
+            <a:extLst>
+              <a:ext uri="{FF2B5EF4-FFF2-40B4-BE49-F238E27FC236}">
+                <a16:creationId xmlns:a16="http://schemas.microsoft.com/office/drawing/2014/main" id="{EBBCA5B2-4445-4604-AF23-5F6A05C915F9}"/>
+              </a:ext>
+            </a:extLst>
+          </p:cNvPr>
+          <p:cNvPicPr>
+            <a:picLocks noGrp="1" noChangeAspect="1"/>
+          </p:cNvPicPr>
+          <p:nvPr>
+            <p:ph idx="1"/>
+          </p:nvPr>
+        </p:nvPicPr>
+        <p:blipFill>
+          <a:blip r:embed="rId2"/>
+          <a:stretch>
+            <a:fillRect/>
+          </a:stretch>
+        </p:blipFill>
+        <p:spPr>
+          <a:xfrm>
+            <a:off x="2689789" y="1106824"/>
+            <a:ext cx="6812421" cy="4893206"/>
+          </a:xfrm>
+        </p:spPr>
+      </p:pic>
+    </p:spTree>
+    <p:extLst>
+      <p:ext uri="{BB962C8B-B14F-4D97-AF65-F5344CB8AC3E}">
+        <p14:creationId xmlns:p14="http://schemas.microsoft.com/office/powerpoint/2010/main" val="3211932879"/>
+      </p:ext>
+    </p:extLst>
+  </p:cSld>
+  <p:clrMapOvr>
+    <a:masterClrMapping/>
+  </p:clrMapOvr>
+  <mc:AlternateContent xmlns:mc="http://schemas.openxmlformats.org/markup-compatibility/2006">
+    <mc:Choice xmlns:p159="http://schemas.microsoft.com/office/powerpoint/2015/09/main" Requires="p159">
+      <p:transition xmlns:p14="http://schemas.microsoft.com/office/powerpoint/2010/main" spd="slow" p14:dur="2000">
+        <p159:morph option="byObject"/>
+      </p:transition>
+    </mc:Choice>
+    <mc:Fallback>
+      <p:transition spd="slow">
+        <p:fade/>
+      </p:transition>
+    </mc:Fallback>
+  </mc:AlternateContent>
+</p:sld>
+</file>
+
+<file path=ppt/slides/slide14.xml><?xml version="1.0" encoding="utf-8"?>
+<p:sld xmlns:a="http://schemas.openxmlformats.org/drawingml/2006/main" xmlns:r="http://schemas.openxmlformats.org/officeDocument/2006/relationships" xmlns:p="http://schemas.openxmlformats.org/presentationml/2006/main">
+  <p:cSld>
+    <p:spTree>
+      <p:nvGrpSpPr>
+        <p:cNvPr id="1" name=""/>
+        <p:cNvGrpSpPr/>
+        <p:nvPr/>
+      </p:nvGrpSpPr>
+      <p:grpSpPr>
+        <a:xfrm>
+          <a:off x="0" y="0"/>
+          <a:ext cx="0" cy="0"/>
+          <a:chOff x="0" y="0"/>
+          <a:chExt cx="0" cy="0"/>
+        </a:xfrm>
+      </p:grpSpPr>
+      <p:sp>
+        <p:nvSpPr>
+          <p:cNvPr id="2" name="Cím 1">
+            <a:extLst>
+              <a:ext uri="{FF2B5EF4-FFF2-40B4-BE49-F238E27FC236}">
+                <a16:creationId xmlns:a16="http://schemas.microsoft.com/office/drawing/2014/main" id="{1958D662-0813-4819-9D00-2C82D5A6E294}"/>
+              </a:ext>
+            </a:extLst>
+          </p:cNvPr>
+          <p:cNvSpPr>
+            <a:spLocks noGrp="1"/>
+          </p:cNvSpPr>
+          <p:nvPr>
+            <p:ph type="title"/>
+          </p:nvPr>
+        </p:nvSpPr>
+        <p:spPr/>
+        <p:txBody>
+          <a:bodyPr/>
+          <a:lstStyle/>
+          <a:p>
+            <a:endParaRPr lang="hu-HU"/>
+          </a:p>
+        </p:txBody>
+      </p:sp>
+      <p:pic>
+        <p:nvPicPr>
+          <p:cNvPr id="5" name="Tartalom helye 4">
+            <a:extLst>
+              <a:ext uri="{FF2B5EF4-FFF2-40B4-BE49-F238E27FC236}">
+                <a16:creationId xmlns:a16="http://schemas.microsoft.com/office/drawing/2014/main" id="{C86F89E7-D8B7-4F00-AE8E-53755A2C34F5}"/>
+              </a:ext>
+            </a:extLst>
+          </p:cNvPr>
+          <p:cNvPicPr>
+            <a:picLocks noGrp="1" noChangeAspect="1"/>
+          </p:cNvPicPr>
+          <p:nvPr>
+            <p:ph idx="1"/>
+          </p:nvPr>
+        </p:nvPicPr>
+        <p:blipFill>
+          <a:blip r:embed="rId2"/>
+          <a:stretch>
+            <a:fillRect/>
+          </a:stretch>
+        </p:blipFill>
+        <p:spPr>
+          <a:xfrm>
+            <a:off x="2683156" y="1108363"/>
+            <a:ext cx="6825687" cy="4903980"/>
+          </a:xfrm>
+        </p:spPr>
+      </p:pic>
+    </p:spTree>
+    <p:extLst>
+      <p:ext uri="{BB962C8B-B14F-4D97-AF65-F5344CB8AC3E}">
+        <p14:creationId xmlns:p14="http://schemas.microsoft.com/office/powerpoint/2010/main" val="1528043827"/>
+      </p:ext>
+    </p:extLst>
+  </p:cSld>
+  <p:clrMapOvr>
+    <a:masterClrMapping/>
+  </p:clrMapOvr>
+  <mc:AlternateContent xmlns:mc="http://schemas.openxmlformats.org/markup-compatibility/2006">
+    <mc:Choice xmlns:p159="http://schemas.microsoft.com/office/powerpoint/2015/09/main" Requires="p159">
+      <p:transition xmlns:p14="http://schemas.microsoft.com/office/powerpoint/2010/main" spd="slow" p14:dur="2000">
+        <p159:morph option="byObject"/>
+      </p:transition>
+    </mc:Choice>
+    <mc:Fallback>
+      <p:transition spd="slow">
+        <p:fade/>
+      </p:transition>
+    </mc:Fallback>
+  </mc:AlternateContent>
+</p:sld>
+</file>
+
+<file path=ppt/slides/slide15.xml><?xml version="1.0" encoding="utf-8"?>
+<p:sld xmlns:a="http://schemas.openxmlformats.org/drawingml/2006/main" xmlns:r="http://schemas.openxmlformats.org/officeDocument/2006/relationships" xmlns:p="http://schemas.openxmlformats.org/presentationml/2006/main">
+  <p:cSld>
+    <p:spTree>
+      <p:nvGrpSpPr>
+        <p:cNvPr id="1" name=""/>
+        <p:cNvGrpSpPr/>
+        <p:nvPr/>
+      </p:nvGrpSpPr>
+      <p:grpSpPr>
+        <a:xfrm>
+          <a:off x="0" y="0"/>
+          <a:ext cx="0" cy="0"/>
+          <a:chOff x="0" y="0"/>
+          <a:chExt cx="0" cy="0"/>
+        </a:xfrm>
+      </p:grpSpPr>
+      <p:sp>
+        <p:nvSpPr>
+          <p:cNvPr id="2" name="Cím 1">
+            <a:extLst>
+              <a:ext uri="{FF2B5EF4-FFF2-40B4-BE49-F238E27FC236}">
+                <a16:creationId xmlns:a16="http://schemas.microsoft.com/office/drawing/2014/main" id="{8A3DF639-46E3-4CEA-87A9-B1D6DD15691F}"/>
+              </a:ext>
+            </a:extLst>
+          </p:cNvPr>
+          <p:cNvSpPr>
+            <a:spLocks noGrp="1"/>
+          </p:cNvSpPr>
+          <p:nvPr>
+            <p:ph type="title"/>
+          </p:nvPr>
+        </p:nvSpPr>
+        <p:spPr/>
+        <p:txBody>
+          <a:bodyPr/>
+          <a:lstStyle/>
+          <a:p>
+            <a:endParaRPr lang="hu-HU"/>
+          </a:p>
+        </p:txBody>
+      </p:sp>
+      <p:pic>
+        <p:nvPicPr>
+          <p:cNvPr id="5" name="Tartalom helye 4" descr="A képen szöveg látható&#10;&#10;Automatikusan generált leírás">
+            <a:extLst>
+              <a:ext uri="{FF2B5EF4-FFF2-40B4-BE49-F238E27FC236}">
+                <a16:creationId xmlns:a16="http://schemas.microsoft.com/office/drawing/2014/main" id="{209856B9-D9B9-48E5-BB25-2A7A84F891E0}"/>
+              </a:ext>
+            </a:extLst>
+          </p:cNvPr>
+          <p:cNvPicPr>
+            <a:picLocks noGrp="1" noChangeAspect="1"/>
+          </p:cNvPicPr>
+          <p:nvPr>
+            <p:ph idx="1"/>
+          </p:nvPr>
+        </p:nvPicPr>
+        <p:blipFill>
+          <a:blip r:embed="rId2"/>
+          <a:stretch>
+            <a:fillRect/>
+          </a:stretch>
+        </p:blipFill>
+        <p:spPr>
+          <a:xfrm>
+            <a:off x="2669051" y="982132"/>
+            <a:ext cx="6853897" cy="4922997"/>
+          </a:xfrm>
+        </p:spPr>
+      </p:pic>
+    </p:spTree>
+    <p:extLst>
+      <p:ext uri="{BB962C8B-B14F-4D97-AF65-F5344CB8AC3E}">
+        <p14:creationId xmlns:p14="http://schemas.microsoft.com/office/powerpoint/2010/main" val="4095330295"/>
+      </p:ext>
+    </p:extLst>
+  </p:cSld>
+  <p:clrMapOvr>
+    <a:masterClrMapping/>
+  </p:clrMapOvr>
+  <mc:AlternateContent xmlns:mc="http://schemas.openxmlformats.org/markup-compatibility/2006">
+    <mc:Choice xmlns:p159="http://schemas.microsoft.com/office/powerpoint/2015/09/main" Requires="p159">
+      <p:transition xmlns:p14="http://schemas.microsoft.com/office/powerpoint/2010/main" spd="slow" p14:dur="2000">
+        <p159:morph option="byObject"/>
+      </p:transition>
+    </mc:Choice>
+    <mc:Fallback>
+      <p:transition spd="slow">
+        <p:fade/>
+      </p:transition>
+    </mc:Fallback>
+  </mc:AlternateContent>
+</p:sld>
+</file>
+
+<file path=ppt/slides/slide16.xml><?xml version="1.0" encoding="utf-8"?>
+<p:sld xmlns:a="http://schemas.openxmlformats.org/drawingml/2006/main" xmlns:r="http://schemas.openxmlformats.org/officeDocument/2006/relationships" xmlns:p="http://schemas.openxmlformats.org/presentationml/2006/main">
+  <p:cSld>
+    <p:spTree>
+      <p:nvGrpSpPr>
+        <p:cNvPr id="1" name=""/>
+        <p:cNvGrpSpPr/>
+        <p:nvPr/>
+      </p:nvGrpSpPr>
+      <p:grpSpPr>
+        <a:xfrm>
+          <a:off x="0" y="0"/>
+          <a:ext cx="0" cy="0"/>
+          <a:chOff x="0" y="0"/>
+          <a:chExt cx="0" cy="0"/>
+        </a:xfrm>
+      </p:grpSpPr>
+      <p:sp>
+        <p:nvSpPr>
+          <p:cNvPr id="2" name="Cím 1">
+            <a:extLst>
+              <a:ext uri="{FF2B5EF4-FFF2-40B4-BE49-F238E27FC236}">
+                <a16:creationId xmlns:a16="http://schemas.microsoft.com/office/drawing/2014/main" id="{1C24B363-0302-47DB-8FC0-00FB8091EB2A}"/>
+              </a:ext>
+            </a:extLst>
+          </p:cNvPr>
+          <p:cNvSpPr>
+            <a:spLocks noGrp="1"/>
+          </p:cNvSpPr>
+          <p:nvPr>
+            <p:ph type="title"/>
+          </p:nvPr>
+        </p:nvSpPr>
+        <p:spPr/>
+        <p:txBody>
+          <a:bodyPr/>
+          <a:lstStyle/>
+          <a:p>
+            <a:r>
+              <a:rPr lang="hu-HU" dirty="0"/>
+              <a:t>Összefoglaló</a:t>
+            </a:r>
+          </a:p>
+        </p:txBody>
+      </p:sp>
+      <p:sp>
+        <p:nvSpPr>
+          <p:cNvPr id="3" name="Tartalom helye 2">
+            <a:extLst>
+              <a:ext uri="{FF2B5EF4-FFF2-40B4-BE49-F238E27FC236}">
+                <a16:creationId xmlns:a16="http://schemas.microsoft.com/office/drawing/2014/main" id="{147A7FCD-4126-41A6-8593-4C171580B28B}"/>
+              </a:ext>
+            </a:extLst>
+          </p:cNvPr>
+          <p:cNvSpPr>
+            <a:spLocks noGrp="1"/>
+          </p:cNvSpPr>
+          <p:nvPr>
+            <p:ph idx="1"/>
+          </p:nvPr>
+        </p:nvSpPr>
+        <p:spPr/>
+        <p:txBody>
+          <a:bodyPr>
+            <a:normAutofit fontScale="92500" lnSpcReduction="10000"/>
+          </a:bodyPr>
+          <a:lstStyle/>
+          <a:p>
+            <a:r>
+              <a:rPr lang="hu-HU" dirty="0"/>
+              <a:t>A beszámoló végén szeretnénk megköszönni, hogy cégünket választotta megbízásával, úgy véljük, hogy az általunk fejlesztett project valós megoldást jelent, cégének adminisztrációs folyamatainak megkönnyítésére.</a:t>
+            </a:r>
+          </a:p>
+          <a:p>
+            <a:r>
+              <a:rPr lang="hu-HU" dirty="0"/>
+              <a:t>Munkatársainak adminisztrációs teendőinek, folyamatainak időtartama jelentős mértékben csökkenni fog, mely a mai világban elengedhetetlen ahhoz, hogy pontos, precíz, gyors szolgáltatást nyújthassanak ügyfeleik számára.</a:t>
+            </a:r>
+          </a:p>
+          <a:p>
+            <a:r>
+              <a:rPr lang="hu-HU" dirty="0"/>
+              <a:t>Főként naprakész, egyszerű programozási technikákat, valamint elrendezés téri dolgokat alkalmaztunk, ennek következtében, biztosak vagyunk abban, hogy munkatársaik előszeretettel fogják használni legújabb alkalmazásukat.</a:t>
+            </a:r>
+          </a:p>
+        </p:txBody>
+      </p:sp>
+    </p:spTree>
+    <p:extLst>
+      <p:ext uri="{BB962C8B-B14F-4D97-AF65-F5344CB8AC3E}">
+        <p14:creationId xmlns:p14="http://schemas.microsoft.com/office/powerpoint/2010/main" val="3331376884"/>
+      </p:ext>
+    </p:extLst>
+  </p:cSld>
+  <p:clrMapOvr>
+    <a:masterClrMapping/>
+  </p:clrMapOvr>
+  <mc:AlternateContent xmlns:mc="http://schemas.openxmlformats.org/markup-compatibility/2006">
+    <mc:Choice xmlns:p159="http://schemas.microsoft.com/office/powerpoint/2015/09/main" Requires="p159">
+      <p:transition xmlns:p14="http://schemas.microsoft.com/office/powerpoint/2010/main" spd="slow" p14:dur="2000">
+        <p159:morph option="byObject"/>
+      </p:transition>
+    </mc:Choice>
+    <mc:Fallback>
+      <p:transition spd="slow">
+        <p:fade/>
+      </p:transition>
+    </mc:Fallback>
+  </mc:AlternateContent>
+</p:sld>
+</file>
+
+<file path=ppt/slides/slide17.xml><?xml version="1.0" encoding="utf-8"?>
+<p:sld xmlns:a="http://schemas.openxmlformats.org/drawingml/2006/main" xmlns:r="http://schemas.openxmlformats.org/officeDocument/2006/relationships" xmlns:p="http://schemas.openxmlformats.org/presentationml/2006/main">
+  <p:cSld>
+    <p:spTree>
+      <p:nvGrpSpPr>
+        <p:cNvPr id="1" name=""/>
+        <p:cNvGrpSpPr/>
+        <p:nvPr/>
+      </p:nvGrpSpPr>
+      <p:grpSpPr>
+        <a:xfrm>
+          <a:off x="0" y="0"/>
+          <a:ext cx="0" cy="0"/>
+          <a:chOff x="0" y="0"/>
+          <a:chExt cx="0" cy="0"/>
+        </a:xfrm>
+      </p:grpSpPr>
+      <p:sp>
+        <p:nvSpPr>
+          <p:cNvPr id="2" name="Cím 1">
+            <a:extLst>
+              <a:ext uri="{FF2B5EF4-FFF2-40B4-BE49-F238E27FC236}">
+                <a16:creationId xmlns:a16="http://schemas.microsoft.com/office/drawing/2014/main" id="{6B30959E-6BB5-46F4-8D82-DA0BF76CED8B}"/>
+              </a:ext>
+            </a:extLst>
+          </p:cNvPr>
+          <p:cNvSpPr>
+            <a:spLocks noGrp="1"/>
+          </p:cNvSpPr>
+          <p:nvPr>
+            <p:ph type="title"/>
+          </p:nvPr>
+        </p:nvSpPr>
+        <p:spPr/>
+        <p:txBody>
+          <a:bodyPr/>
+          <a:lstStyle/>
+          <a:p>
+            <a:endParaRPr lang="hu-HU"/>
+          </a:p>
+        </p:txBody>
+      </p:sp>
+      <p:sp>
+        <p:nvSpPr>
+          <p:cNvPr id="3" name="Tartalom helye 2">
+            <a:extLst>
+              <a:ext uri="{FF2B5EF4-FFF2-40B4-BE49-F238E27FC236}">
+                <a16:creationId xmlns:a16="http://schemas.microsoft.com/office/drawing/2014/main" id="{9066BA17-6817-4259-B168-81D0BBDDFCDB}"/>
+              </a:ext>
+            </a:extLst>
+          </p:cNvPr>
+          <p:cNvSpPr>
+            <a:spLocks noGrp="1"/>
+          </p:cNvSpPr>
+          <p:nvPr>
+            <p:ph idx="1"/>
+          </p:nvPr>
+        </p:nvSpPr>
+        <p:spPr>
+          <a:xfrm>
+            <a:off x="1295401" y="3429000"/>
+            <a:ext cx="9601196" cy="2446868"/>
+          </a:xfrm>
+        </p:spPr>
+        <p:txBody>
+          <a:bodyPr>
+            <a:normAutofit/>
+          </a:bodyPr>
+          <a:lstStyle/>
+          <a:p>
+            <a:pPr marL="0" indent="0">
+              <a:buNone/>
+            </a:pPr>
+            <a:r>
+              <a:rPr lang="hu-HU" sz="6600" dirty="0"/>
+              <a:t>  Köszönjük figyelmüket! </a:t>
+            </a:r>
+            <a:r>
+              <a:rPr lang="hu-HU" sz="6600" dirty="0">
+                <a:sym typeface="Wingdings" panose="05000000000000000000" pitchFamily="2" charset="2"/>
+              </a:rPr>
+              <a:t></a:t>
+            </a:r>
+            <a:endParaRPr lang="hu-HU" sz="6600" dirty="0"/>
+          </a:p>
+        </p:txBody>
+      </p:sp>
+    </p:spTree>
+    <p:extLst>
+      <p:ext uri="{BB962C8B-B14F-4D97-AF65-F5344CB8AC3E}">
+        <p14:creationId xmlns:p14="http://schemas.microsoft.com/office/powerpoint/2010/main" val="581605439"/>
+      </p:ext>
+    </p:extLst>
+  </p:cSld>
+  <p:clrMapOvr>
+    <a:masterClrMapping/>
+  </p:clrMapOvr>
+  <mc:AlternateContent xmlns:mc="http://schemas.openxmlformats.org/markup-compatibility/2006">
+    <mc:Choice xmlns:p159="http://schemas.microsoft.com/office/powerpoint/2015/09/main" Requires="p159">
+      <p:transition xmlns:p14="http://schemas.microsoft.com/office/powerpoint/2010/main" spd="slow" p14:dur="2000">
+        <p159:morph option="byObject"/>
+      </p:transition>
+    </mc:Choice>
+    <mc:Fallback>
+      <p:transition spd="slow">
+        <p:fade/>
+      </p:transition>
+    </mc:Fallback>
+  </mc:AlternateContent>
 </p:sld>
 </file>
 
@@ -5853,6 +6682,18 @@
   <p:clrMapOvr>
     <a:masterClrMapping/>
   </p:clrMapOvr>
+  <mc:AlternateContent xmlns:mc="http://schemas.openxmlformats.org/markup-compatibility/2006">
+    <mc:Choice xmlns:p159="http://schemas.microsoft.com/office/powerpoint/2015/09/main" Requires="p159">
+      <p:transition xmlns:p14="http://schemas.microsoft.com/office/powerpoint/2010/main" spd="slow" p14:dur="2000">
+        <p159:morph option="byObject"/>
+      </p:transition>
+    </mc:Choice>
+    <mc:Fallback>
+      <p:transition spd="slow">
+        <p:fade/>
+      </p:transition>
+    </mc:Fallback>
+  </mc:AlternateContent>
 </p:sld>
 </file>
 
@@ -5949,6 +6790,18 @@
   <p:clrMapOvr>
     <a:masterClrMapping/>
   </p:clrMapOvr>
+  <mc:AlternateContent xmlns:mc="http://schemas.openxmlformats.org/markup-compatibility/2006">
+    <mc:Choice xmlns:p159="http://schemas.microsoft.com/office/powerpoint/2015/09/main" Requires="p159">
+      <p:transition xmlns:p14="http://schemas.microsoft.com/office/powerpoint/2010/main" spd="slow" p14:dur="2000">
+        <p159:morph option="byObject"/>
+      </p:transition>
+    </mc:Choice>
+    <mc:Fallback>
+      <p:transition spd="slow">
+        <p:fade/>
+      </p:transition>
+    </mc:Fallback>
+  </mc:AlternateContent>
 </p:sld>
 </file>
 
@@ -6059,6 +6912,18 @@
   <p:clrMapOvr>
     <a:masterClrMapping/>
   </p:clrMapOvr>
+  <mc:AlternateContent xmlns:mc="http://schemas.openxmlformats.org/markup-compatibility/2006">
+    <mc:Choice xmlns:p159="http://schemas.microsoft.com/office/powerpoint/2015/09/main" Requires="p159">
+      <p:transition xmlns:p14="http://schemas.microsoft.com/office/powerpoint/2010/main" spd="slow" p14:dur="2000">
+        <p159:morph option="byObject"/>
+      </p:transition>
+    </mc:Choice>
+    <mc:Fallback>
+      <p:transition spd="slow">
+        <p:fade/>
+      </p:transition>
+    </mc:Fallback>
+  </mc:AlternateContent>
 </p:sld>
 </file>
 
@@ -6189,6 +7054,18 @@
   <p:clrMapOvr>
     <a:masterClrMapping/>
   </p:clrMapOvr>
+  <mc:AlternateContent xmlns:mc="http://schemas.openxmlformats.org/markup-compatibility/2006">
+    <mc:Choice xmlns:p159="http://schemas.microsoft.com/office/powerpoint/2015/09/main" Requires="p159">
+      <p:transition xmlns:p14="http://schemas.microsoft.com/office/powerpoint/2010/main" spd="slow" p14:dur="2000">
+        <p159:morph option="byObject"/>
+      </p:transition>
+    </mc:Choice>
+    <mc:Fallback>
+      <p:transition spd="slow">
+        <p:fade/>
+      </p:transition>
+    </mc:Fallback>
+  </mc:AlternateContent>
 </p:sld>
 </file>
 
@@ -6323,6 +7200,18 @@
   <p:clrMapOvr>
     <a:masterClrMapping/>
   </p:clrMapOvr>
+  <mc:AlternateContent xmlns:mc="http://schemas.openxmlformats.org/markup-compatibility/2006">
+    <mc:Choice xmlns:p159="http://schemas.microsoft.com/office/powerpoint/2015/09/main" Requires="p159">
+      <p:transition xmlns:p14="http://schemas.microsoft.com/office/powerpoint/2010/main" spd="slow" p14:dur="2000">
+        <p159:morph option="byObject"/>
+      </p:transition>
+    </mc:Choice>
+    <mc:Fallback>
+      <p:transition spd="slow">
+        <p:fade/>
+      </p:transition>
+    </mc:Fallback>
+  </mc:AlternateContent>
 </p:sld>
 </file>
 
@@ -6471,6 +7360,18 @@
   <p:clrMapOvr>
     <a:masterClrMapping/>
   </p:clrMapOvr>
+  <mc:AlternateContent xmlns:mc="http://schemas.openxmlformats.org/markup-compatibility/2006">
+    <mc:Choice xmlns:p159="http://schemas.microsoft.com/office/powerpoint/2015/09/main" Requires="p159">
+      <p:transition xmlns:p14="http://schemas.microsoft.com/office/powerpoint/2010/main" spd="slow" p14:dur="2000">
+        <p159:morph option="byObject"/>
+      </p:transition>
+    </mc:Choice>
+    <mc:Fallback>
+      <p:transition spd="slow">
+        <p:fade/>
+      </p:transition>
+    </mc:Fallback>
+  </mc:AlternateContent>
 </p:sld>
 </file>
 
@@ -6606,6 +7507,18 @@
   <p:clrMapOvr>
     <a:masterClrMapping/>
   </p:clrMapOvr>
+  <mc:AlternateContent xmlns:mc="http://schemas.openxmlformats.org/markup-compatibility/2006">
+    <mc:Choice xmlns:p159="http://schemas.microsoft.com/office/powerpoint/2015/09/main" Requires="p159">
+      <p:transition xmlns:p14="http://schemas.microsoft.com/office/powerpoint/2010/main" spd="slow" p14:dur="2000">
+        <p159:morph option="byObject"/>
+      </p:transition>
+    </mc:Choice>
+    <mc:Fallback>
+      <p:transition spd="slow">
+        <p:fade/>
+      </p:transition>
+    </mc:Fallback>
+  </mc:AlternateContent>
 </p:sld>
 </file>
 
@@ -6647,7 +7560,10 @@
           <a:bodyPr/>
           <a:lstStyle/>
           <a:p>
-            <a:endParaRPr lang="hu-HU"/>
+            <a:r>
+              <a:rPr lang="hu-HU" dirty="0"/>
+              <a:t>Ami még vár ránk…</a:t>
+            </a:r>
           </a:p>
         </p:txBody>
       </p:sp>
@@ -6672,7 +7588,40 @@
           <a:bodyPr/>
           <a:lstStyle/>
           <a:p>
-            <a:endParaRPr lang="hu-HU"/>
+            <a:r>
+              <a:rPr lang="hu-HU" dirty="0"/>
+              <a:t>Szerkesztő ablakok hozzáadása</a:t>
+            </a:r>
+          </a:p>
+          <a:p>
+            <a:r>
+              <a:rPr lang="hu-HU" dirty="0"/>
+              <a:t>CSS továbbfejlesztése</a:t>
+            </a:r>
+          </a:p>
+          <a:p>
+            <a:r>
+              <a:rPr lang="hu-HU" dirty="0"/>
+              <a:t>Megjelenés módosítása</a:t>
+            </a:r>
+          </a:p>
+          <a:p>
+            <a:r>
+              <a:rPr lang="hu-HU" dirty="0"/>
+              <a:t>Törlés funkció megírása</a:t>
+            </a:r>
+          </a:p>
+          <a:p>
+            <a:r>
+              <a:rPr lang="hu-HU" dirty="0"/>
+              <a:t>Adatok vizualizációjának javítása</a:t>
+            </a:r>
+          </a:p>
+          <a:p>
+            <a:r>
+              <a:rPr lang="hu-HU" dirty="0"/>
+              <a:t>Adatok megfelelő formátumban történő bekérésének beállítása</a:t>
+            </a:r>
           </a:p>
         </p:txBody>
       </p:sp>
@@ -6686,6 +7635,18 @@
   <p:clrMapOvr>
     <a:masterClrMapping/>
   </p:clrMapOvr>
+  <mc:AlternateContent xmlns:mc="http://schemas.openxmlformats.org/markup-compatibility/2006">
+    <mc:Choice xmlns:p159="http://schemas.microsoft.com/office/powerpoint/2015/09/main" Requires="p159">
+      <p:transition xmlns:p14="http://schemas.microsoft.com/office/powerpoint/2010/main" spd="slow" p14:dur="2000">
+        <p159:morph option="byObject"/>
+      </p:transition>
+    </mc:Choice>
+    <mc:Fallback>
+      <p:transition spd="slow">
+        <p:fade/>
+      </p:transition>
+    </mc:Fallback>
+  </mc:AlternateContent>
 </p:sld>
 </file>
 

</xml_diff>